<commit_message>
Update UiClassDiagram with SortControls
</commit_message>
<xml_diff>
--- a/docs/diagrams/UiComponentClassDiagram.pptx
+++ b/docs/diagrams/UiComponentClassDiagram.pptx
@@ -208,7 +208,7 @@
           <a:p>
             <a:fld id="{F5CC4B3F-88C1-4FFA-B1B6-F41C21DC6924}" type="datetimeFigureOut">
               <a:rPr lang="en-US" smtClean="0"/>
-              <a:t>1/7/2017</a:t>
+              <a:t>11/12/17</a:t>
             </a:fld>
             <a:endParaRPr lang="en-US"/>
           </a:p>
@@ -654,7 +654,7 @@
           <a:p>
             <a:fld id="{78C97017-6FC3-485B-9764-EAC9E56C1D49}" type="datetimeFigureOut">
               <a:rPr lang="en-US" smtClean="0"/>
-              <a:t>1/7/2017</a:t>
+              <a:t>11/12/17</a:t>
             </a:fld>
             <a:endParaRPr lang="en-US"/>
           </a:p>
@@ -822,7 +822,7 @@
           <a:p>
             <a:fld id="{78C97017-6FC3-485B-9764-EAC9E56C1D49}" type="datetimeFigureOut">
               <a:rPr lang="en-US" smtClean="0"/>
-              <a:t>1/7/2017</a:t>
+              <a:t>11/12/17</a:t>
             </a:fld>
             <a:endParaRPr lang="en-US"/>
           </a:p>
@@ -1000,7 +1000,7 @@
           <a:p>
             <a:fld id="{78C97017-6FC3-485B-9764-EAC9E56C1D49}" type="datetimeFigureOut">
               <a:rPr lang="en-US" smtClean="0"/>
-              <a:t>1/7/2017</a:t>
+              <a:t>11/12/17</a:t>
             </a:fld>
             <a:endParaRPr lang="en-US"/>
           </a:p>
@@ -1168,7 +1168,7 @@
           <a:p>
             <a:fld id="{78C97017-6FC3-485B-9764-EAC9E56C1D49}" type="datetimeFigureOut">
               <a:rPr lang="en-US" smtClean="0"/>
-              <a:t>1/7/2017</a:t>
+              <a:t>11/12/17</a:t>
             </a:fld>
             <a:endParaRPr lang="en-US"/>
           </a:p>
@@ -1413,7 +1413,7 @@
           <a:p>
             <a:fld id="{78C97017-6FC3-485B-9764-EAC9E56C1D49}" type="datetimeFigureOut">
               <a:rPr lang="en-US" smtClean="0"/>
-              <a:t>1/7/2017</a:t>
+              <a:t>11/12/17</a:t>
             </a:fld>
             <a:endParaRPr lang="en-US"/>
           </a:p>
@@ -1698,7 +1698,7 @@
           <a:p>
             <a:fld id="{78C97017-6FC3-485B-9764-EAC9E56C1D49}" type="datetimeFigureOut">
               <a:rPr lang="en-US" smtClean="0"/>
-              <a:t>1/7/2017</a:t>
+              <a:t>11/12/17</a:t>
             </a:fld>
             <a:endParaRPr lang="en-US"/>
           </a:p>
@@ -2117,7 +2117,7 @@
           <a:p>
             <a:fld id="{78C97017-6FC3-485B-9764-EAC9E56C1D49}" type="datetimeFigureOut">
               <a:rPr lang="en-US" smtClean="0"/>
-              <a:t>1/7/2017</a:t>
+              <a:t>11/12/17</a:t>
             </a:fld>
             <a:endParaRPr lang="en-US"/>
           </a:p>
@@ -2234,7 +2234,7 @@
           <a:p>
             <a:fld id="{78C97017-6FC3-485B-9764-EAC9E56C1D49}" type="datetimeFigureOut">
               <a:rPr lang="en-US" smtClean="0"/>
-              <a:t>1/7/2017</a:t>
+              <a:t>11/12/17</a:t>
             </a:fld>
             <a:endParaRPr lang="en-US"/>
           </a:p>
@@ -2329,7 +2329,7 @@
           <a:p>
             <a:fld id="{78C97017-6FC3-485B-9764-EAC9E56C1D49}" type="datetimeFigureOut">
               <a:rPr lang="en-US" smtClean="0"/>
-              <a:t>1/7/2017</a:t>
+              <a:t>11/12/17</a:t>
             </a:fld>
             <a:endParaRPr lang="en-US"/>
           </a:p>
@@ -2604,7 +2604,7 @@
           <a:p>
             <a:fld id="{78C97017-6FC3-485B-9764-EAC9E56C1D49}" type="datetimeFigureOut">
               <a:rPr lang="en-US" smtClean="0"/>
-              <a:t>1/7/2017</a:t>
+              <a:t>11/12/17</a:t>
             </a:fld>
             <a:endParaRPr lang="en-US"/>
           </a:p>
@@ -2856,7 +2856,7 @@
           <a:p>
             <a:fld id="{78C97017-6FC3-485B-9764-EAC9E56C1D49}" type="datetimeFigureOut">
               <a:rPr lang="en-US" smtClean="0"/>
-              <a:t>1/7/2017</a:t>
+              <a:t>11/12/17</a:t>
             </a:fld>
             <a:endParaRPr lang="en-US"/>
           </a:p>
@@ -3067,7 +3067,7 @@
           <a:p>
             <a:fld id="{78C97017-6FC3-485B-9764-EAC9E56C1D49}" type="datetimeFigureOut">
               <a:rPr lang="en-US" smtClean="0"/>
-              <a:t>1/7/2017</a:t>
+              <a:t>11/12/17</a:t>
             </a:fld>
             <a:endParaRPr lang="en-US"/>
           </a:p>
@@ -3451,7 +3451,7 @@
         <p:spPr>
           <a:xfrm>
             <a:off x="1217465" y="1447800"/>
-            <a:ext cx="4917083" cy="3962400"/>
+            <a:ext cx="4917083" cy="4267200"/>
           </a:xfrm>
           <a:prstGeom prst="roundRect">
             <a:avLst>
@@ -3545,7 +3545,7 @@
           <a:p>
             <a:pPr algn="ctr"/>
             <a:r>
-              <a:rPr lang="en-US" sz="1050" b="1" dirty="0" err="1">
+              <a:rPr lang="en-US" sz="1050" b="1" dirty="0">
                 <a:solidFill>
                   <a:schemeClr val="accent3">
                     <a:lumMod val="75000"/>
@@ -3605,7 +3605,7 @@
           <a:p>
             <a:pPr algn="ctr"/>
             <a:r>
-              <a:rPr lang="en-US" sz="1050" b="1" dirty="0" err="1">
+              <a:rPr lang="en-US" sz="1050" b="1" dirty="0">
                 <a:solidFill>
                   <a:schemeClr val="accent3">
                     <a:lumMod val="75000"/>
@@ -3668,7 +3668,7 @@
           <a:p>
             <a:pPr algn="ctr"/>
             <a:r>
-              <a:rPr lang="en-US" sz="1050" dirty="0" err="1">
+              <a:rPr lang="en-US" sz="1050" dirty="0">
                 <a:solidFill>
                   <a:schemeClr val="bg1"/>
                 </a:solidFill>
@@ -3918,7 +3918,7 @@
           <a:p>
             <a:pPr algn="ctr"/>
             <a:r>
-              <a:rPr lang="en-US" sz="1050" b="1" dirty="0" err="1">
+              <a:rPr lang="en-US" sz="1050" b="1" dirty="0">
                 <a:solidFill>
                   <a:schemeClr val="accent3">
                     <a:lumMod val="75000"/>
@@ -3945,7 +3945,7 @@
         </p:nvSpPr>
         <p:spPr>
           <a:xfrm>
-            <a:off x="2592527" y="4563759"/>
+            <a:off x="2592522" y="4932277"/>
             <a:ext cx="1093635" cy="236841"/>
           </a:xfrm>
           <a:prstGeom prst="rect">
@@ -3978,7 +3978,7 @@
           <a:p>
             <a:pPr algn="ctr"/>
             <a:r>
-              <a:rPr lang="en-US" sz="1050" b="1" dirty="0" err="1">
+              <a:rPr lang="en-US" sz="1050" b="1" dirty="0">
                 <a:solidFill>
                   <a:schemeClr val="accent3">
                     <a:lumMod val="75000"/>
@@ -4038,7 +4038,7 @@
           <a:p>
             <a:pPr algn="ctr"/>
             <a:r>
-              <a:rPr lang="en-US" sz="1050" b="1" dirty="0" err="1">
+              <a:rPr lang="en-US" sz="1050" b="1" dirty="0">
                 <a:solidFill>
                   <a:schemeClr val="accent3">
                     <a:lumMod val="75000"/>
@@ -4098,7 +4098,7 @@
           <a:p>
             <a:pPr algn="ctr"/>
             <a:r>
-              <a:rPr lang="en-US" sz="1050" b="1" dirty="0" err="1">
+              <a:rPr lang="en-US" sz="1050" b="1" dirty="0">
                 <a:solidFill>
                   <a:schemeClr val="accent3">
                     <a:lumMod val="75000"/>
@@ -4125,7 +4125,7 @@
         </p:nvSpPr>
         <p:spPr>
           <a:xfrm>
-            <a:off x="2592528" y="4966000"/>
+            <a:off x="2592525" y="5274878"/>
             <a:ext cx="1093635" cy="236841"/>
           </a:xfrm>
           <a:prstGeom prst="rect">
@@ -4158,7 +4158,7 @@
           <a:p>
             <a:pPr algn="ctr"/>
             <a:r>
-              <a:rPr lang="en-US" sz="1050" b="1" dirty="0" err="1">
+              <a:rPr lang="en-US" sz="1050" b="1" dirty="0">
                 <a:solidFill>
                   <a:schemeClr val="accent3">
                     <a:lumMod val="75000"/>
@@ -4185,8 +4185,8 @@
         </p:nvSpPr>
         <p:spPr>
           <a:xfrm>
-            <a:off x="2324548" y="2706452"/>
-            <a:ext cx="183156" cy="161573"/>
+            <a:off x="2324548" y="2687980"/>
+            <a:ext cx="176401" cy="180045"/>
           </a:xfrm>
           <a:prstGeom prst="flowChartDecision">
             <a:avLst/>
@@ -4236,8 +4236,8 @@
         </p:nvCxnSpPr>
         <p:spPr>
           <a:xfrm rot="16200000" flipH="1">
-            <a:off x="2393229" y="2890922"/>
-            <a:ext cx="222196" cy="176402"/>
+            <a:off x="2391540" y="2889233"/>
+            <a:ext cx="222196" cy="179779"/>
           </a:xfrm>
           <a:prstGeom prst="bentConnector2">
             <a:avLst/>
@@ -4307,7 +4307,7 @@
           <a:p>
             <a:pPr algn="ctr"/>
             <a:r>
-              <a:rPr lang="en-US" sz="1050" b="1" dirty="0" err="1">
+              <a:rPr lang="en-US" sz="1050" b="1" dirty="0">
                 <a:solidFill>
                   <a:schemeClr val="accent3">
                     <a:lumMod val="75000"/>
@@ -4337,8 +4337,8 @@
         </p:nvCxnSpPr>
         <p:spPr>
           <a:xfrm rot="16200000" flipH="1">
-            <a:off x="2054450" y="3229701"/>
-            <a:ext cx="899755" cy="176402"/>
+            <a:off x="2052761" y="3228012"/>
+            <a:ext cx="899755" cy="179779"/>
           </a:xfrm>
           <a:prstGeom prst="bentConnector2">
             <a:avLst/>
@@ -4378,8 +4378,8 @@
         </p:nvCxnSpPr>
         <p:spPr>
           <a:xfrm rot="16200000" flipH="1">
-            <a:off x="1883148" y="3401003"/>
-            <a:ext cx="1242356" cy="176400"/>
+            <a:off x="1881459" y="3399314"/>
+            <a:ext cx="1242356" cy="179777"/>
           </a:xfrm>
           <a:prstGeom prst="bentConnector2">
             <a:avLst/>
@@ -4419,8 +4419,8 @@
         </p:nvCxnSpPr>
         <p:spPr>
           <a:xfrm rot="16200000" flipH="1">
-            <a:off x="1597249" y="3686901"/>
-            <a:ext cx="1814155" cy="176401"/>
+            <a:off x="1411299" y="3869474"/>
+            <a:ext cx="2182673" cy="179773"/>
           </a:xfrm>
           <a:prstGeom prst="bentConnector2">
             <a:avLst/>
@@ -4459,8 +4459,8 @@
         </p:nvCxnSpPr>
         <p:spPr>
           <a:xfrm rot="16200000" flipH="1">
-            <a:off x="1184119" y="3676012"/>
-            <a:ext cx="2396440" cy="420377"/>
+            <a:off x="1009831" y="3810604"/>
+            <a:ext cx="2705187" cy="460202"/>
           </a:xfrm>
           <a:prstGeom prst="bentConnector2">
             <a:avLst/>
@@ -4549,7 +4549,7 @@
               </a:rPr>
             </a:br>
             <a:r>
-              <a:rPr lang="en-US" sz="1050" b="1" dirty="0" err="1">
+              <a:rPr lang="en-US" sz="1050" b="1" dirty="0">
                 <a:solidFill>
                   <a:schemeClr val="accent3">
                     <a:lumMod val="75000"/>
@@ -4743,8 +4743,8 @@
         </p:nvCxnSpPr>
         <p:spPr>
           <a:xfrm rot="5400000">
-            <a:off x="3409976" y="2562187"/>
-            <a:ext cx="2396180" cy="1843807"/>
+            <a:off x="3225714" y="2746443"/>
+            <a:ext cx="2764698" cy="1843812"/>
           </a:xfrm>
           <a:prstGeom prst="bentConnector2">
             <a:avLst/>
@@ -4784,8 +4784,8 @@
         </p:nvCxnSpPr>
         <p:spPr>
           <a:xfrm rot="5400000">
-            <a:off x="3208856" y="2763307"/>
-            <a:ext cx="2798421" cy="1843806"/>
+            <a:off x="3054416" y="2917745"/>
+            <a:ext cx="3107299" cy="1843809"/>
           </a:xfrm>
           <a:prstGeom prst="bentConnector2">
             <a:avLst/>
@@ -4970,7 +4970,7 @@
           <a:p>
             <a:pPr algn="ctr"/>
             <a:r>
-              <a:rPr lang="en-US" sz="1050" dirty="0" err="1">
+              <a:rPr lang="en-US" sz="1050" dirty="0">
                 <a:solidFill>
                   <a:schemeClr val="bg1"/>
                 </a:solidFill>
@@ -5086,8 +5086,8 @@
         </p:nvCxnSpPr>
         <p:spPr>
           <a:xfrm rot="16200000" flipH="1">
-            <a:off x="2226110" y="3058040"/>
-            <a:ext cx="554704" cy="174673"/>
+            <a:off x="2224422" y="3056352"/>
+            <a:ext cx="554704" cy="178050"/>
           </a:xfrm>
           <a:prstGeom prst="bentConnector2">
             <a:avLst/>
@@ -5509,6 +5509,145 @@
           </a:p>
         </p:txBody>
       </p:sp>
+      <p:sp>
+        <p:nvSpPr>
+          <p:cNvPr id="46" name="Rectangle 11"/>
+          <p:cNvSpPr/>
+          <p:nvPr/>
+        </p:nvSpPr>
+        <p:spPr>
+          <a:xfrm>
+            <a:off x="2582371" y="4516223"/>
+            <a:ext cx="1093635" cy="236841"/>
+          </a:xfrm>
+          <a:prstGeom prst="rect">
+            <a:avLst/>
+          </a:prstGeom>
+          <a:ln w="19050">
+            <a:solidFill>
+              <a:schemeClr val="accent3"/>
+            </a:solidFill>
+          </a:ln>
+          <a:effectLst/>
+        </p:spPr>
+        <p:style>
+          <a:lnRef idx="1">
+            <a:schemeClr val="accent3"/>
+          </a:lnRef>
+          <a:fillRef idx="2">
+            <a:schemeClr val="accent3"/>
+          </a:fillRef>
+          <a:effectRef idx="1">
+            <a:schemeClr val="accent3"/>
+          </a:effectRef>
+          <a:fontRef idx="minor">
+            <a:schemeClr val="dk1"/>
+          </a:fontRef>
+        </p:style>
+        <p:txBody>
+          <a:bodyPr rtlCol="0" anchor="ctr"/>
+          <a:lstStyle/>
+          <a:p>
+            <a:pPr algn="ctr"/>
+            <a:r>
+              <a:rPr lang="en-US" sz="1050" b="1" dirty="0" smtClean="0">
+                <a:solidFill>
+                  <a:schemeClr val="accent3">
+                    <a:lumMod val="75000"/>
+                  </a:schemeClr>
+                </a:solidFill>
+              </a:rPr>
+              <a:t>SortControls</a:t>
+            </a:r>
+            <a:endParaRPr lang="en-SG" sz="1050" b="1" dirty="0">
+              <a:solidFill>
+                <a:schemeClr val="accent3">
+                  <a:lumMod val="75000"/>
+                </a:schemeClr>
+              </a:solidFill>
+            </a:endParaRPr>
+          </a:p>
+        </p:txBody>
+      </p:sp>
+      <p:cxnSp>
+        <p:nvCxnSpPr>
+          <p:cNvPr id="11" name="Elbow Connector 10"/>
+          <p:cNvCxnSpPr>
+            <a:stCxn id="39" idx="2"/>
+            <a:endCxn id="46" idx="1"/>
+          </p:cNvCxnSpPr>
+          <p:nvPr/>
+        </p:nvCxnSpPr>
+        <p:spPr>
+          <a:xfrm rot="16200000" flipH="1">
+            <a:off x="1614251" y="3666523"/>
+            <a:ext cx="1766619" cy="169622"/>
+          </a:xfrm>
+          <a:prstGeom prst="bentConnector2">
+            <a:avLst/>
+          </a:prstGeom>
+          <a:ln w="19050">
+            <a:solidFill>
+              <a:schemeClr val="accent3"/>
+            </a:solidFill>
+            <a:headEnd type="none" w="med" len="med"/>
+            <a:tailEnd type="arrow" w="med" len="med"/>
+          </a:ln>
+          <a:effectLst/>
+        </p:spPr>
+        <p:style>
+          <a:lnRef idx="1">
+            <a:schemeClr val="accent2"/>
+          </a:lnRef>
+          <a:fillRef idx="2">
+            <a:schemeClr val="accent2"/>
+          </a:fillRef>
+          <a:effectRef idx="1">
+            <a:schemeClr val="accent2"/>
+          </a:effectRef>
+          <a:fontRef idx="minor">
+            <a:schemeClr val="dk1"/>
+          </a:fontRef>
+        </p:style>
+      </p:cxnSp>
+      <p:cxnSp>
+        <p:nvCxnSpPr>
+          <p:cNvPr id="57" name="Elbow Connector 63"/>
+          <p:cNvCxnSpPr/>
+          <p:nvPr/>
+        </p:nvCxnSpPr>
+        <p:spPr>
+          <a:xfrm rot="5400000">
+            <a:off x="3697715" y="2796936"/>
+            <a:ext cx="1824381" cy="1843808"/>
+          </a:xfrm>
+          <a:prstGeom prst="bentConnector2">
+            <a:avLst/>
+          </a:prstGeom>
+          <a:ln w="6350">
+            <a:solidFill>
+              <a:schemeClr val="accent3"/>
+            </a:solidFill>
+            <a:headEnd type="none" w="med" len="med"/>
+            <a:tailEnd type="none" w="med" len="med"/>
+          </a:ln>
+          <a:effectLst/>
+        </p:spPr>
+        <p:style>
+          <a:lnRef idx="1">
+            <a:schemeClr val="accent2"/>
+          </a:lnRef>
+          <a:fillRef idx="2">
+            <a:schemeClr val="accent2"/>
+          </a:fillRef>
+          <a:effectRef idx="1">
+            <a:schemeClr val="accent2"/>
+          </a:effectRef>
+          <a:fontRef idx="minor">
+            <a:schemeClr val="dk1"/>
+          </a:fontRef>
+        </p:style>
+      </p:cxnSp>
     </p:spTree>
     <p:extLst>
       <p:ext uri="{BB962C8B-B14F-4D97-AF65-F5344CB8AC3E}">

</xml_diff>

<commit_message>
Dev guide updates (#109)
* Update DevGuide images

Added Sequence diagram for PasswordCommand.

* Update Collate documents

* Update Collate
</commit_message>
<xml_diff>
--- a/docs/diagrams/UiComponentClassDiagram.pptx
+++ b/docs/diagrams/UiComponentClassDiagram.pptx
@@ -126,6 +126,10 @@
 </p:presentation>
 </file>
 
+<file path=ppt/revisionInfo.xml><?xml version="1.0" encoding="utf-8"?>
+<p1510:revInfo xmlns:a="http://schemas.openxmlformats.org/drawingml/2006/main" xmlns:r="http://schemas.openxmlformats.org/officeDocument/2006/relationships" xmlns:p1510="http://schemas.microsoft.com/office/powerpoint/2015/10/main"/>
+</file>
+
 <file path=ppt/notesMasters/notesMaster1.xml><?xml version="1.0" encoding="utf-8"?>
 <p:notesMaster xmlns:a="http://schemas.openxmlformats.org/drawingml/2006/main" xmlns:r="http://schemas.openxmlformats.org/officeDocument/2006/relationships" xmlns:p="http://schemas.openxmlformats.org/presentationml/2006/main">
   <p:cSld>
@@ -208,7 +212,7 @@
           <a:p>
             <a:fld id="{F5CC4B3F-88C1-4FFA-B1B6-F41C21DC6924}" type="datetimeFigureOut">
               <a:rPr lang="en-US" smtClean="0"/>
-              <a:t>11/12/17</a:t>
+              <a:t>13-Nov-17</a:t>
             </a:fld>
             <a:endParaRPr lang="en-US"/>
           </a:p>
@@ -654,7 +658,7 @@
           <a:p>
             <a:fld id="{78C97017-6FC3-485B-9764-EAC9E56C1D49}" type="datetimeFigureOut">
               <a:rPr lang="en-US" smtClean="0"/>
-              <a:t>11/12/17</a:t>
+              <a:t>13-Nov-17</a:t>
             </a:fld>
             <a:endParaRPr lang="en-US"/>
           </a:p>
@@ -822,7 +826,7 @@
           <a:p>
             <a:fld id="{78C97017-6FC3-485B-9764-EAC9E56C1D49}" type="datetimeFigureOut">
               <a:rPr lang="en-US" smtClean="0"/>
-              <a:t>11/12/17</a:t>
+              <a:t>13-Nov-17</a:t>
             </a:fld>
             <a:endParaRPr lang="en-US"/>
           </a:p>
@@ -1000,7 +1004,7 @@
           <a:p>
             <a:fld id="{78C97017-6FC3-485B-9764-EAC9E56C1D49}" type="datetimeFigureOut">
               <a:rPr lang="en-US" smtClean="0"/>
-              <a:t>11/12/17</a:t>
+              <a:t>13-Nov-17</a:t>
             </a:fld>
             <a:endParaRPr lang="en-US"/>
           </a:p>
@@ -1168,7 +1172,7 @@
           <a:p>
             <a:fld id="{78C97017-6FC3-485B-9764-EAC9E56C1D49}" type="datetimeFigureOut">
               <a:rPr lang="en-US" smtClean="0"/>
-              <a:t>11/12/17</a:t>
+              <a:t>13-Nov-17</a:t>
             </a:fld>
             <a:endParaRPr lang="en-US"/>
           </a:p>
@@ -1413,7 +1417,7 @@
           <a:p>
             <a:fld id="{78C97017-6FC3-485B-9764-EAC9E56C1D49}" type="datetimeFigureOut">
               <a:rPr lang="en-US" smtClean="0"/>
-              <a:t>11/12/17</a:t>
+              <a:t>13-Nov-17</a:t>
             </a:fld>
             <a:endParaRPr lang="en-US"/>
           </a:p>
@@ -1698,7 +1702,7 @@
           <a:p>
             <a:fld id="{78C97017-6FC3-485B-9764-EAC9E56C1D49}" type="datetimeFigureOut">
               <a:rPr lang="en-US" smtClean="0"/>
-              <a:t>11/12/17</a:t>
+              <a:t>13-Nov-17</a:t>
             </a:fld>
             <a:endParaRPr lang="en-US"/>
           </a:p>
@@ -2117,7 +2121,7 @@
           <a:p>
             <a:fld id="{78C97017-6FC3-485B-9764-EAC9E56C1D49}" type="datetimeFigureOut">
               <a:rPr lang="en-US" smtClean="0"/>
-              <a:t>11/12/17</a:t>
+              <a:t>13-Nov-17</a:t>
             </a:fld>
             <a:endParaRPr lang="en-US"/>
           </a:p>
@@ -2234,7 +2238,7 @@
           <a:p>
             <a:fld id="{78C97017-6FC3-485B-9764-EAC9E56C1D49}" type="datetimeFigureOut">
               <a:rPr lang="en-US" smtClean="0"/>
-              <a:t>11/12/17</a:t>
+              <a:t>13-Nov-17</a:t>
             </a:fld>
             <a:endParaRPr lang="en-US"/>
           </a:p>
@@ -2329,7 +2333,7 @@
           <a:p>
             <a:fld id="{78C97017-6FC3-485B-9764-EAC9E56C1D49}" type="datetimeFigureOut">
               <a:rPr lang="en-US" smtClean="0"/>
-              <a:t>11/12/17</a:t>
+              <a:t>13-Nov-17</a:t>
             </a:fld>
             <a:endParaRPr lang="en-US"/>
           </a:p>
@@ -2604,7 +2608,7 @@
           <a:p>
             <a:fld id="{78C97017-6FC3-485B-9764-EAC9E56C1D49}" type="datetimeFigureOut">
               <a:rPr lang="en-US" smtClean="0"/>
-              <a:t>11/12/17</a:t>
+              <a:t>13-Nov-17</a:t>
             </a:fld>
             <a:endParaRPr lang="en-US"/>
           </a:p>
@@ -2856,7 +2860,7 @@
           <a:p>
             <a:fld id="{78C97017-6FC3-485B-9764-EAC9E56C1D49}" type="datetimeFigureOut">
               <a:rPr lang="en-US" smtClean="0"/>
-              <a:t>11/12/17</a:t>
+              <a:t>13-Nov-17</a:t>
             </a:fld>
             <a:endParaRPr lang="en-US"/>
           </a:p>
@@ -3067,7 +3071,7 @@
           <a:p>
             <a:fld id="{78C97017-6FC3-485B-9764-EAC9E56C1D49}" type="datetimeFigureOut">
               <a:rPr lang="en-US" smtClean="0"/>
-              <a:t>11/12/17</a:t>
+              <a:t>13-Nov-17</a:t>
             </a:fld>
             <a:endParaRPr lang="en-US"/>
           </a:p>
@@ -3450,8 +3454,8 @@
         </p:nvSpPr>
         <p:spPr>
           <a:xfrm>
-            <a:off x="1217465" y="1447800"/>
-            <a:ext cx="4917083" cy="4267200"/>
+            <a:off x="1217465" y="1447799"/>
+            <a:ext cx="4917083" cy="4724381"/>
           </a:xfrm>
           <a:prstGeom prst="roundRect">
             <a:avLst>
@@ -3545,7 +3549,7 @@
           <a:p>
             <a:pPr algn="ctr"/>
             <a:r>
-              <a:rPr lang="en-US" sz="1050" b="1" dirty="0">
+              <a:rPr lang="en-US" sz="1050" b="1" dirty="0" err="1">
                 <a:solidFill>
                   <a:schemeClr val="accent3">
                     <a:lumMod val="75000"/>
@@ -3605,7 +3609,7 @@
           <a:p>
             <a:pPr algn="ctr"/>
             <a:r>
-              <a:rPr lang="en-US" sz="1050" b="1" dirty="0">
+              <a:rPr lang="en-US" sz="1050" b="1" dirty="0" err="1">
                 <a:solidFill>
                   <a:schemeClr val="accent3">
                     <a:lumMod val="75000"/>
@@ -3668,7 +3672,7 @@
           <a:p>
             <a:pPr algn="ctr"/>
             <a:r>
-              <a:rPr lang="en-US" sz="1050" dirty="0">
+              <a:rPr lang="en-US" sz="1050" dirty="0" err="1">
                 <a:solidFill>
                   <a:schemeClr val="bg1"/>
                 </a:solidFill>
@@ -3918,7 +3922,7 @@
           <a:p>
             <a:pPr algn="ctr"/>
             <a:r>
-              <a:rPr lang="en-US" sz="1050" b="1" dirty="0">
+              <a:rPr lang="en-US" sz="1050" b="1" dirty="0" err="1">
                 <a:solidFill>
                   <a:schemeClr val="accent3">
                     <a:lumMod val="75000"/>
@@ -3945,7 +3949,7 @@
         </p:nvSpPr>
         <p:spPr>
           <a:xfrm>
-            <a:off x="2592522" y="4932277"/>
+            <a:off x="2592527" y="5380718"/>
             <a:ext cx="1093635" cy="236841"/>
           </a:xfrm>
           <a:prstGeom prst="rect">
@@ -3978,7 +3982,7 @@
           <a:p>
             <a:pPr algn="ctr"/>
             <a:r>
-              <a:rPr lang="en-US" sz="1050" b="1" dirty="0">
+              <a:rPr lang="en-US" sz="1050" b="1" dirty="0" err="1">
                 <a:solidFill>
                   <a:schemeClr val="accent3">
                     <a:lumMod val="75000"/>
@@ -4038,7 +4042,7 @@
           <a:p>
             <a:pPr algn="ctr"/>
             <a:r>
-              <a:rPr lang="en-US" sz="1050" b="1" dirty="0">
+              <a:rPr lang="en-US" sz="1050" b="1" dirty="0" err="1">
                 <a:solidFill>
                   <a:schemeClr val="accent3">
                     <a:lumMod val="75000"/>
@@ -4098,7 +4102,7 @@
           <a:p>
             <a:pPr algn="ctr"/>
             <a:r>
-              <a:rPr lang="en-US" sz="1050" b="1" dirty="0">
+              <a:rPr lang="en-US" sz="1050" b="1" dirty="0" err="1">
                 <a:solidFill>
                   <a:schemeClr val="accent3">
                     <a:lumMod val="75000"/>
@@ -4125,7 +4129,7 @@
         </p:nvSpPr>
         <p:spPr>
           <a:xfrm>
-            <a:off x="2592525" y="5274878"/>
+            <a:off x="2592528" y="5782959"/>
             <a:ext cx="1093635" cy="236841"/>
           </a:xfrm>
           <a:prstGeom prst="rect">
@@ -4158,7 +4162,7 @@
           <a:p>
             <a:pPr algn="ctr"/>
             <a:r>
-              <a:rPr lang="en-US" sz="1050" b="1" dirty="0">
+              <a:rPr lang="en-US" sz="1050" b="1" dirty="0" err="1">
                 <a:solidFill>
                   <a:schemeClr val="accent3">
                     <a:lumMod val="75000"/>
@@ -4185,8 +4189,8 @@
         </p:nvSpPr>
         <p:spPr>
           <a:xfrm>
-            <a:off x="2324548" y="2687980"/>
-            <a:ext cx="176401" cy="180045"/>
+            <a:off x="2324548" y="2706452"/>
+            <a:ext cx="183156" cy="161573"/>
           </a:xfrm>
           <a:prstGeom prst="flowChartDecision">
             <a:avLst/>
@@ -4236,8 +4240,8 @@
         </p:nvCxnSpPr>
         <p:spPr>
           <a:xfrm rot="16200000" flipH="1">
-            <a:off x="2391540" y="2889233"/>
-            <a:ext cx="222196" cy="179779"/>
+            <a:off x="2393229" y="2890922"/>
+            <a:ext cx="222196" cy="176402"/>
           </a:xfrm>
           <a:prstGeom prst="bentConnector2">
             <a:avLst/>
@@ -4307,7 +4311,7 @@
           <a:p>
             <a:pPr algn="ctr"/>
             <a:r>
-              <a:rPr lang="en-US" sz="1050" b="1" dirty="0">
+              <a:rPr lang="en-US" sz="1050" b="1" dirty="0" err="1">
                 <a:solidFill>
                   <a:schemeClr val="accent3">
                     <a:lumMod val="75000"/>
@@ -4337,8 +4341,8 @@
         </p:nvCxnSpPr>
         <p:spPr>
           <a:xfrm rot="16200000" flipH="1">
-            <a:off x="2052761" y="3228012"/>
-            <a:ext cx="899755" cy="179779"/>
+            <a:off x="2054450" y="3229701"/>
+            <a:ext cx="899755" cy="176402"/>
           </a:xfrm>
           <a:prstGeom prst="bentConnector2">
             <a:avLst/>
@@ -4378,8 +4382,8 @@
         </p:nvCxnSpPr>
         <p:spPr>
           <a:xfrm rot="16200000" flipH="1">
-            <a:off x="1881459" y="3399314"/>
-            <a:ext cx="1242356" cy="179777"/>
+            <a:off x="1883148" y="3401003"/>
+            <a:ext cx="1242356" cy="176400"/>
           </a:xfrm>
           <a:prstGeom prst="bentConnector2">
             <a:avLst/>
@@ -4419,8 +4423,8 @@
         </p:nvCxnSpPr>
         <p:spPr>
           <a:xfrm rot="16200000" flipH="1">
-            <a:off x="1411299" y="3869474"/>
-            <a:ext cx="2182673" cy="179773"/>
+            <a:off x="1188769" y="4095381"/>
+            <a:ext cx="2631114" cy="176401"/>
           </a:xfrm>
           <a:prstGeom prst="bentConnector2">
             <a:avLst/>
@@ -4453,14 +4457,15 @@
         <p:nvCxnSpPr>
           <p:cNvPr id="53" name="Elbow Connector 63"/>
           <p:cNvCxnSpPr>
+            <a:cxnSpLocks/>
             <a:endCxn id="38" idx="1"/>
           </p:cNvCxnSpPr>
           <p:nvPr/>
         </p:nvCxnSpPr>
         <p:spPr>
           <a:xfrm rot="16200000" flipH="1">
-            <a:off x="1009831" y="3810604"/>
-            <a:ext cx="2705187" cy="460202"/>
+            <a:off x="776053" y="4084905"/>
+            <a:ext cx="3213400" cy="419550"/>
           </a:xfrm>
           <a:prstGeom prst="bentConnector2">
             <a:avLst/>
@@ -4549,7 +4554,7 @@
               </a:rPr>
             </a:br>
             <a:r>
-              <a:rPr lang="en-US" sz="1050" b="1" dirty="0">
+              <a:rPr lang="en-US" sz="1050" b="1" dirty="0" err="1">
                 <a:solidFill>
                   <a:schemeClr val="accent3">
                     <a:lumMod val="75000"/>
@@ -4743,8 +4748,8 @@
         </p:nvCxnSpPr>
         <p:spPr>
           <a:xfrm rot="5400000">
-            <a:off x="3225714" y="2746443"/>
-            <a:ext cx="2764698" cy="1843812"/>
+            <a:off x="3001497" y="2970666"/>
+            <a:ext cx="3213139" cy="1843807"/>
           </a:xfrm>
           <a:prstGeom prst="bentConnector2">
             <a:avLst/>
@@ -4784,8 +4789,8 @@
         </p:nvCxnSpPr>
         <p:spPr>
           <a:xfrm rot="5400000">
-            <a:off x="3054416" y="2917745"/>
-            <a:ext cx="3107299" cy="1843809"/>
+            <a:off x="2800376" y="3171787"/>
+            <a:ext cx="3615380" cy="1843806"/>
           </a:xfrm>
           <a:prstGeom prst="bentConnector2">
             <a:avLst/>
@@ -4970,7 +4975,7 @@
           <a:p>
             <a:pPr algn="ctr"/>
             <a:r>
-              <a:rPr lang="en-US" sz="1050" dirty="0">
+              <a:rPr lang="en-US" sz="1050" dirty="0" err="1">
                 <a:solidFill>
                   <a:schemeClr val="bg1"/>
                 </a:solidFill>
@@ -5086,8 +5091,8 @@
         </p:nvCxnSpPr>
         <p:spPr>
           <a:xfrm rot="16200000" flipH="1">
-            <a:off x="2224422" y="3056352"/>
-            <a:ext cx="554704" cy="178050"/>
+            <a:off x="2226110" y="3058040"/>
+            <a:ext cx="554704" cy="174673"/>
           </a:xfrm>
           <a:prstGeom prst="bentConnector2">
             <a:avLst/>
@@ -5511,13 +5516,19 @@
       </p:sp>
       <p:sp>
         <p:nvSpPr>
-          <p:cNvPr id="46" name="Rectangle 11"/>
+          <p:cNvPr id="42" name="Rectangle 11">
+            <a:extLst>
+              <a:ext uri="{FF2B5EF4-FFF2-40B4-BE49-F238E27FC236}">
+                <a16:creationId xmlns:a16="http://schemas.microsoft.com/office/drawing/2014/main" id="{18EB3661-06FE-46E6-8734-6A033A6A6E85}"/>
+              </a:ext>
+            </a:extLst>
+          </p:cNvPr>
           <p:cNvSpPr/>
           <p:nvPr/>
         </p:nvSpPr>
         <p:spPr>
           <a:xfrm>
-            <a:off x="2582371" y="4516223"/>
+            <a:off x="2590799" y="4515357"/>
             <a:ext cx="1093635" cy="236841"/>
           </a:xfrm>
           <a:prstGeom prst="rect">
@@ -5550,7 +5561,7 @@
           <a:p>
             <a:pPr algn="ctr"/>
             <a:r>
-              <a:rPr lang="en-US" sz="1050" b="1" dirty="0" smtClean="0">
+              <a:rPr lang="en-US" sz="1050" b="1" dirty="0" err="1">
                 <a:solidFill>
                   <a:schemeClr val="accent3">
                     <a:lumMod val="75000"/>
@@ -5569,19 +5580,92 @@
           </a:p>
         </p:txBody>
       </p:sp>
+      <p:sp>
+        <p:nvSpPr>
+          <p:cNvPr id="45" name="Rectangle 11">
+            <a:extLst>
+              <a:ext uri="{FF2B5EF4-FFF2-40B4-BE49-F238E27FC236}">
+                <a16:creationId xmlns:a16="http://schemas.microsoft.com/office/drawing/2014/main" id="{A4D50925-5DF3-4B08-825C-050556D05431}"/>
+              </a:ext>
+            </a:extLst>
+          </p:cNvPr>
+          <p:cNvSpPr/>
+          <p:nvPr/>
+        </p:nvSpPr>
+        <p:spPr>
+          <a:xfrm>
+            <a:off x="2590800" y="4917598"/>
+            <a:ext cx="1447800" cy="236841"/>
+          </a:xfrm>
+          <a:prstGeom prst="rect">
+            <a:avLst/>
+          </a:prstGeom>
+          <a:ln w="19050">
+            <a:solidFill>
+              <a:schemeClr val="accent3"/>
+            </a:solidFill>
+          </a:ln>
+          <a:effectLst/>
+        </p:spPr>
+        <p:style>
+          <a:lnRef idx="1">
+            <a:schemeClr val="accent3"/>
+          </a:lnRef>
+          <a:fillRef idx="2">
+            <a:schemeClr val="accent3"/>
+          </a:fillRef>
+          <a:effectRef idx="1">
+            <a:schemeClr val="accent3"/>
+          </a:effectRef>
+          <a:fontRef idx="minor">
+            <a:schemeClr val="dk1"/>
+          </a:fontRef>
+        </p:style>
+        <p:txBody>
+          <a:bodyPr rtlCol="0" anchor="ctr"/>
+          <a:lstStyle/>
+          <a:p>
+            <a:pPr algn="ctr"/>
+            <a:r>
+              <a:rPr lang="en-US" sz="1050" b="1" dirty="0" err="1">
+                <a:solidFill>
+                  <a:schemeClr val="accent3">
+                    <a:lumMod val="75000"/>
+                  </a:schemeClr>
+                </a:solidFill>
+              </a:rPr>
+              <a:t>PersonDetailsPanel</a:t>
+            </a:r>
+            <a:endParaRPr lang="en-SG" sz="1050" b="1" dirty="0">
+              <a:solidFill>
+                <a:schemeClr val="accent3">
+                  <a:lumMod val="75000"/>
+                </a:schemeClr>
+              </a:solidFill>
+            </a:endParaRPr>
+          </a:p>
+        </p:txBody>
+      </p:sp>
       <p:cxnSp>
         <p:nvCxnSpPr>
-          <p:cNvPr id="11" name="Elbow Connector 10"/>
+          <p:cNvPr id="46" name="Elbow Connector 63">
+            <a:extLst>
+              <a:ext uri="{FF2B5EF4-FFF2-40B4-BE49-F238E27FC236}">
+                <a16:creationId xmlns:a16="http://schemas.microsoft.com/office/drawing/2014/main" id="{96FEDEFD-B14C-4695-B7ED-1166EB9BC45E}"/>
+              </a:ext>
+            </a:extLst>
+          </p:cNvPr>
           <p:cNvCxnSpPr>
+            <a:cxnSpLocks/>
             <a:stCxn id="39" idx="2"/>
-            <a:endCxn id="46" idx="1"/>
+            <a:endCxn id="42" idx="1"/>
           </p:cNvCxnSpPr>
           <p:nvPr/>
         </p:nvCxnSpPr>
         <p:spPr>
           <a:xfrm rot="16200000" flipH="1">
-            <a:off x="1614251" y="3666523"/>
-            <a:ext cx="1766619" cy="169622"/>
+            <a:off x="1620586" y="3663564"/>
+            <a:ext cx="1765753" cy="174673"/>
           </a:xfrm>
           <a:prstGeom prst="bentConnector2">
             <a:avLst/>
@@ -5612,14 +5696,267 @@
       </p:cxnSp>
       <p:cxnSp>
         <p:nvCxnSpPr>
-          <p:cNvPr id="57" name="Elbow Connector 63"/>
-          <p:cNvCxnSpPr/>
+          <p:cNvPr id="48" name="Elbow Connector 63">
+            <a:extLst>
+              <a:ext uri="{FF2B5EF4-FFF2-40B4-BE49-F238E27FC236}">
+                <a16:creationId xmlns:a16="http://schemas.microsoft.com/office/drawing/2014/main" id="{DAAD9F6D-AA4B-4DD4-8995-E2E843D2F89D}"/>
+              </a:ext>
+            </a:extLst>
+          </p:cNvPr>
+          <p:cNvCxnSpPr>
+            <a:cxnSpLocks/>
+            <a:stCxn id="39" idx="2"/>
+            <a:endCxn id="45" idx="1"/>
+          </p:cNvCxnSpPr>
           <p:nvPr/>
         </p:nvCxnSpPr>
         <p:spPr>
+          <a:xfrm rot="16200000" flipH="1">
+            <a:off x="1419466" y="3864685"/>
+            <a:ext cx="2167994" cy="174674"/>
+          </a:xfrm>
+          <a:prstGeom prst="bentConnector2">
+            <a:avLst/>
+          </a:prstGeom>
+          <a:ln w="19050">
+            <a:solidFill>
+              <a:schemeClr val="accent3"/>
+            </a:solidFill>
+            <a:headEnd type="none" w="med" len="med"/>
+            <a:tailEnd type="arrow" w="med" len="med"/>
+          </a:ln>
+          <a:effectLst/>
+        </p:spPr>
+        <p:style>
+          <a:lnRef idx="1">
+            <a:schemeClr val="accent2"/>
+          </a:lnRef>
+          <a:fillRef idx="2">
+            <a:schemeClr val="accent2"/>
+          </a:fillRef>
+          <a:effectRef idx="1">
+            <a:schemeClr val="accent2"/>
+          </a:effectRef>
+          <a:fontRef idx="minor">
+            <a:schemeClr val="dk1"/>
+          </a:fontRef>
+        </p:style>
+      </p:cxnSp>
+      <p:sp>
+        <p:nvSpPr>
+          <p:cNvPr id="52" name="Freeform 117">
+            <a:extLst>
+              <a:ext uri="{FF2B5EF4-FFF2-40B4-BE49-F238E27FC236}">
+                <a16:creationId xmlns:a16="http://schemas.microsoft.com/office/drawing/2014/main" id="{6C0A54FB-C47F-41E2-BE5E-6AEE616D7D1A}"/>
+              </a:ext>
+            </a:extLst>
+          </p:cNvPr>
+          <p:cNvSpPr/>
+          <p:nvPr/>
+        </p:nvSpPr>
+        <p:spPr>
+          <a:xfrm flipV="1">
+            <a:off x="3981174" y="5173748"/>
+            <a:ext cx="2754341" cy="101600"/>
+          </a:xfrm>
+          <a:custGeom>
+            <a:avLst/>
+            <a:gdLst>
+              <a:gd name="connsiteX0" fmla="*/ 0 w 3048000"/>
+              <a:gd name="connsiteY0" fmla="*/ 203200 h 203200"/>
+              <a:gd name="connsiteX1" fmla="*/ 221673 w 3048000"/>
+              <a:gd name="connsiteY1" fmla="*/ 0 h 203200"/>
+              <a:gd name="connsiteX2" fmla="*/ 3048000 w 3048000"/>
+              <a:gd name="connsiteY2" fmla="*/ 0 h 203200"/>
+            </a:gdLst>
+            <a:ahLst/>
+            <a:cxnLst>
+              <a:cxn ang="0">
+                <a:pos x="connsiteX0" y="connsiteY0"/>
+              </a:cxn>
+              <a:cxn ang="0">
+                <a:pos x="connsiteX1" y="connsiteY1"/>
+              </a:cxn>
+              <a:cxn ang="0">
+                <a:pos x="connsiteX2" y="connsiteY2"/>
+              </a:cxn>
+            </a:cxnLst>
+            <a:rect l="l" t="t" r="r" b="b"/>
+            <a:pathLst>
+              <a:path w="3048000" h="203200">
+                <a:moveTo>
+                  <a:pt x="0" y="203200"/>
+                </a:moveTo>
+                <a:lnTo>
+                  <a:pt x="221673" y="0"/>
+                </a:lnTo>
+                <a:lnTo>
+                  <a:pt x="3048000" y="0"/>
+                </a:lnTo>
+              </a:path>
+            </a:pathLst>
+          </a:custGeom>
+          <a:noFill/>
+          <a:ln w="19050">
+            <a:solidFill>
+              <a:schemeClr val="accent3"/>
+            </a:solidFill>
+            <a:prstDash val="sysDot"/>
+            <a:headEnd type="none" w="med" len="med"/>
+            <a:tailEnd type="arrow" w="med" len="med"/>
+          </a:ln>
+          <a:effectLst/>
+        </p:spPr>
+        <p:style>
+          <a:lnRef idx="1">
+            <a:schemeClr val="accent2"/>
+          </a:lnRef>
+          <a:fillRef idx="2">
+            <a:schemeClr val="accent2"/>
+          </a:fillRef>
+          <a:effectRef idx="1">
+            <a:schemeClr val="accent2"/>
+          </a:effectRef>
+          <a:fontRef idx="minor">
+            <a:schemeClr val="dk1"/>
+          </a:fontRef>
+        </p:style>
+        <p:txBody>
+          <a:bodyPr rtlCol="0" anchor="ctr"/>
+          <a:lstStyle/>
+          <a:p>
+            <a:pPr algn="ctr"/>
+            <a:endParaRPr lang="en-SG"/>
+          </a:p>
+        </p:txBody>
+      </p:sp>
+      <p:sp>
+        <p:nvSpPr>
+          <p:cNvPr id="54" name="Rectangle 53">
+            <a:extLst>
+              <a:ext uri="{FF2B5EF4-FFF2-40B4-BE49-F238E27FC236}">
+                <a16:creationId xmlns:a16="http://schemas.microsoft.com/office/drawing/2014/main" id="{C06B9E17-C329-45B2-85BE-9852C59B3C21}"/>
+              </a:ext>
+            </a:extLst>
+          </p:cNvPr>
+          <p:cNvSpPr/>
+          <p:nvPr/>
+        </p:nvSpPr>
+        <p:spPr>
+          <a:xfrm>
+            <a:off x="5423316" y="5195317"/>
+            <a:ext cx="229325" cy="160062"/>
+          </a:xfrm>
+          <a:prstGeom prst="rect">
+            <a:avLst/>
+          </a:prstGeom>
+          <a:solidFill>
+            <a:schemeClr val="accent3">
+              <a:lumMod val="20000"/>
+              <a:lumOff val="80000"/>
+              <a:alpha val="80000"/>
+            </a:schemeClr>
+          </a:solidFill>
+          <a:ln>
+            <a:noFill/>
+          </a:ln>
+          <a:effectLst>
+            <a:softEdge rad="31750"/>
+          </a:effectLst>
+        </p:spPr>
+        <p:style>
+          <a:lnRef idx="2">
+            <a:schemeClr val="accent1">
+              <a:shade val="50000"/>
+            </a:schemeClr>
+          </a:lnRef>
+          <a:fillRef idx="1">
+            <a:schemeClr val="accent1"/>
+          </a:fillRef>
+          <a:effectRef idx="0">
+            <a:schemeClr val="accent1"/>
+          </a:effectRef>
+          <a:fontRef idx="minor">
+            <a:schemeClr val="lt1"/>
+          </a:fontRef>
+        </p:style>
+        <p:txBody>
+          <a:bodyPr rtlCol="0" anchor="ctr"/>
+          <a:lstStyle/>
+          <a:p>
+            <a:pPr algn="ctr"/>
+            <a:endParaRPr lang="en-SG"/>
+          </a:p>
+        </p:txBody>
+      </p:sp>
+      <p:cxnSp>
+        <p:nvCxnSpPr>
+          <p:cNvPr id="55" name="Elbow Connector 63">
+            <a:extLst>
+              <a:ext uri="{FF2B5EF4-FFF2-40B4-BE49-F238E27FC236}">
+                <a16:creationId xmlns:a16="http://schemas.microsoft.com/office/drawing/2014/main" id="{4CDFE151-2D7B-487A-89DD-3E861561DF82}"/>
+              </a:ext>
+            </a:extLst>
+          </p:cNvPr>
+          <p:cNvCxnSpPr>
+            <a:cxnSpLocks/>
+            <a:stCxn id="16" idx="3"/>
+            <a:endCxn id="45" idx="3"/>
+          </p:cNvCxnSpPr>
+          <p:nvPr/>
+        </p:nvCxnSpPr>
+        <p:spPr>
           <a:xfrm rot="5400000">
-            <a:off x="3697715" y="2796936"/>
-            <a:ext cx="1824381" cy="1843808"/>
+            <a:off x="3409276" y="2915325"/>
+            <a:ext cx="2750019" cy="1491369"/>
+          </a:xfrm>
+          <a:prstGeom prst="bentConnector2">
+            <a:avLst/>
+          </a:prstGeom>
+          <a:ln w="6350">
+            <a:solidFill>
+              <a:schemeClr val="accent3"/>
+            </a:solidFill>
+            <a:headEnd type="none" w="med" len="med"/>
+            <a:tailEnd type="none" w="med" len="med"/>
+          </a:ln>
+          <a:effectLst/>
+        </p:spPr>
+        <p:style>
+          <a:lnRef idx="1">
+            <a:schemeClr val="accent2"/>
+          </a:lnRef>
+          <a:fillRef idx="2">
+            <a:schemeClr val="accent2"/>
+          </a:fillRef>
+          <a:effectRef idx="1">
+            <a:schemeClr val="accent2"/>
+          </a:effectRef>
+          <a:fontRef idx="minor">
+            <a:schemeClr val="dk1"/>
+          </a:fontRef>
+        </p:style>
+      </p:cxnSp>
+      <p:cxnSp>
+        <p:nvCxnSpPr>
+          <p:cNvPr id="56" name="Elbow Connector 63">
+            <a:extLst>
+              <a:ext uri="{FF2B5EF4-FFF2-40B4-BE49-F238E27FC236}">
+                <a16:creationId xmlns:a16="http://schemas.microsoft.com/office/drawing/2014/main" id="{6AC27766-761A-4CEF-B14F-DE35F274F7E1}"/>
+              </a:ext>
+            </a:extLst>
+          </p:cNvPr>
+          <p:cNvCxnSpPr>
+            <a:cxnSpLocks/>
+            <a:stCxn id="16" idx="3"/>
+            <a:endCxn id="42" idx="3"/>
+          </p:cNvCxnSpPr>
+          <p:nvPr/>
+        </p:nvCxnSpPr>
+        <p:spPr>
+          <a:xfrm rot="5400000">
+            <a:off x="3433313" y="2537122"/>
+            <a:ext cx="2347778" cy="1845535"/>
           </a:xfrm>
           <a:prstGeom prst="bentConnector2">
             <a:avLst/>

</xml_diff>